<commit_message>
added creating workspace to slides
</commit_message>
<xml_diff>
--- a/powerpoint/Overview.pptx
+++ b/powerpoint/Overview.pptx
@@ -5,7 +5,7 @@
     <p:sldMasterId id="2147483648" r:id="rId1"/>
   </p:sldMasterIdLst>
   <p:notesMasterIdLst>
-    <p:notesMasterId r:id="rId50"/>
+    <p:notesMasterId r:id="rId58"/>
   </p:notesMasterIdLst>
   <p:sldIdLst>
     <p:sldId id="256" r:id="rId2"/>
@@ -55,7 +55,15 @@
     <p:sldId id="1923" r:id="rId46"/>
     <p:sldId id="4165" r:id="rId47"/>
     <p:sldId id="4166" r:id="rId48"/>
-    <p:sldId id="4167" r:id="rId49"/>
+    <p:sldId id="4170" r:id="rId49"/>
+    <p:sldId id="4171" r:id="rId50"/>
+    <p:sldId id="4172" r:id="rId51"/>
+    <p:sldId id="4167" r:id="rId52"/>
+    <p:sldId id="4173" r:id="rId53"/>
+    <p:sldId id="4174" r:id="rId54"/>
+    <p:sldId id="4175" r:id="rId55"/>
+    <p:sldId id="4177" r:id="rId56"/>
+    <p:sldId id="4178" r:id="rId57"/>
   </p:sldIdLst>
   <p:sldSz cx="12192000" cy="6858000"/>
   <p:notesSz cx="6858000" cy="9144000"/>
@@ -206,7 +214,15 @@
             <p14:sldId id="1923"/>
             <p14:sldId id="4165"/>
             <p14:sldId id="4166"/>
+            <p14:sldId id="4170"/>
+            <p14:sldId id="4171"/>
+            <p14:sldId id="4172"/>
             <p14:sldId id="4167"/>
+            <p14:sldId id="4173"/>
+            <p14:sldId id="4174"/>
+            <p14:sldId id="4175"/>
+            <p14:sldId id="4177"/>
+            <p14:sldId id="4178"/>
           </p14:sldIdLst>
         </p14:section>
       </p14:sectionLst>
@@ -6376,34 +6392,6 @@
 </inkml:ink>
 </file>
 
-<file path=ppt/ink/ink47.xml><?xml version="1.0" encoding="utf-8"?>
-<inkml:ink xmlns:inkml="http://www.w3.org/2003/InkML">
-  <inkml:definitions>
-    <inkml:context xml:id="ctx0">
-      <inkml:inkSource xml:id="inkSrc0">
-        <inkml:traceFormat>
-          <inkml:channel name="X" type="integer" min="-2.14748E9" max="2.14748E9" units="cm"/>
-          <inkml:channel name="Y" type="integer" min="-2.14748E9" max="2.14748E9" units="cm"/>
-        </inkml:traceFormat>
-        <inkml:channelProperties>
-          <inkml:channelProperty channel="X" name="resolution" value="1000" units="1/cm"/>
-          <inkml:channelProperty channel="Y" name="resolution" value="1000" units="1/cm"/>
-        </inkml:channelProperties>
-      </inkml:inkSource>
-      <inkml:timestamp xml:id="ts0" timeString="2019-08-03T08:27:28.994"/>
-    </inkml:context>
-    <inkml:brush xml:id="br0">
-      <inkml:brushProperty name="width" value="0.1" units="cm"/>
-      <inkml:brushProperty name="height" value="0.1" units="cm"/>
-      <inkml:brushProperty name="color" value="#E71224"/>
-      <inkml:brushProperty name="ignorePressure" value="1"/>
-    </inkml:brush>
-  </inkml:definitions>
-  <inkml:trace contextRef="#ctx0" brushRef="#br0">2188 450,'-253'-6,"-13"0,143 9,0 4,-55 14,109-9,0 3,2 3,0 2,1 4,-4 5,-3 5,1 4,2 3,2 3,-40 36,59-40,2 2,2 2,2 2,1 2,3 1,-5 13,26-33,0 0,2 1,1 1,2 0,1 1,1 1,2-1,1 2,2-1,1 1,2 0,1 0,2 0,1 4,1-22,0 0,2 0,0 0,0 0,1-1,1 0,1 0,0 0,1-1,1 0,0-1,1 1,0-2,8 9,12 8,1-1,0-2,2 0,1-3,12 6,27 12,1-3,3-3,1-4,1-3,23 3,95 18,129 13,100-5,279-4,431-30,-198-26,-676-5,-1-11,-2-11,86-29,-190 25,-3-7,-1-7,-2-6,-3-6,-2-7,6-12,-80 39,-2-3,-1-3,-3-4,21-22,-56 45,0-2,-2-1,-2-1,-1-2,-1 0,-2-1,-1-1,-2-1,8-22,-14 23,-1-1,-1 0,-2 0,-2-1,-1 0,-2-1,-1 1,-3-26,-2 31,-1 1,-1-1,-1 1,-2 1,-2-1,0 2,-2-1,-1 1,-1 1,-9-10,3 7,-1 2,-2 0,-1 2,-1 0,-1 2,-15-10,1 3,-3 2,0 2,-2 2,-14-5,-40-12,-2 4,-2 4,-1 5,-7 3,-215-37,-51 17,-57 18,-1484 8,1533 29,69 7,78 4,163-11,0 3,-39 13,56-6</inkml:trace>
-  <inkml:trace contextRef="#ctx0" brushRef="#br0" timeOffset="6234.175">4925 1325,'0'0</inkml:trace>
-</inkml:ink>
-</file>
-
 <file path=ppt/ink/ink5.xml><?xml version="1.0" encoding="utf-8"?>
 <inkml:ink xmlns:inkml="http://www.w3.org/2003/InkML">
   <inkml:definitions>
@@ -7541,7 +7529,7 @@
           <a:p>
             <a:fld id="{386CE63F-9E7F-4C04-9D0D-FCA25A8E9E86}" type="datetime8">
               <a:rPr lang="en-US" smtClean="0"/>
-              <a:t>8/3/2019 1:29 AM</a:t>
+              <a:t>8/3/2019 7:49 PM</a:t>
             </a:fld>
             <a:endParaRPr lang="en-US"/>
           </a:p>
@@ -7746,7 +7734,7 @@
           <a:p>
             <a:fld id="{386CE63F-9E7F-4C04-9D0D-FCA25A8E9E86}" type="datetime8">
               <a:rPr lang="en-US" smtClean="0"/>
-              <a:t>8/3/2019 1:29 AM</a:t>
+              <a:t>8/3/2019 7:49 PM</a:t>
             </a:fld>
             <a:endParaRPr lang="en-US"/>
           </a:p>
@@ -7854,7 +7842,7 @@
           <a:p>
             <a:fld id="{2126B422-C3A4-45C9-B6F7-EF1779E1F3DD}" type="slidenum">
               <a:rPr lang="en-US" smtClean="0"/>
-              <a:t>48</a:t>
+              <a:t>51</a:t>
             </a:fld>
             <a:endParaRPr lang="en-US"/>
           </a:p>
@@ -33769,179 +33757,215 @@
           <a:chExt cx="0" cy="0"/>
         </a:xfrm>
       </p:grpSpPr>
+      <p:sp>
+        <p:nvSpPr>
+          <p:cNvPr id="2" name="Title 1">
+            <a:extLst>
+              <a:ext uri="{FF2B5EF4-FFF2-40B4-BE49-F238E27FC236}">
+                <a16:creationId xmlns:a16="http://schemas.microsoft.com/office/drawing/2014/main" id="{88B52891-D270-4E8B-A988-5CEBD9D390A3}"/>
+              </a:ext>
+            </a:extLst>
+          </p:cNvPr>
+          <p:cNvSpPr>
+            <a:spLocks noGrp="1"/>
+          </p:cNvSpPr>
+          <p:nvPr>
+            <p:ph type="title"/>
+          </p:nvPr>
+        </p:nvSpPr>
+        <p:spPr/>
+        <p:txBody>
+          <a:bodyPr>
+            <a:normAutofit/>
+          </a:bodyPr>
+          <a:lstStyle/>
+          <a:p>
+            <a:r>
+              <a:rPr lang="en-US" sz="6000" b="1" dirty="0"/>
+              <a:t>Login or Create an Azure Account</a:t>
+            </a:r>
+          </a:p>
+        </p:txBody>
+      </p:sp>
+      <p:sp>
+        <p:nvSpPr>
+          <p:cNvPr id="3" name="Content Placeholder 2">
+            <a:extLst>
+              <a:ext uri="{FF2B5EF4-FFF2-40B4-BE49-F238E27FC236}">
+                <a16:creationId xmlns:a16="http://schemas.microsoft.com/office/drawing/2014/main" id="{807FBD7D-D6F2-448F-9F7F-1D3D60F49F1A}"/>
+              </a:ext>
+            </a:extLst>
+          </p:cNvPr>
+          <p:cNvSpPr>
+            <a:spLocks noGrp="1"/>
+          </p:cNvSpPr>
+          <p:nvPr>
+            <p:ph idx="1"/>
+          </p:nvPr>
+        </p:nvSpPr>
+        <p:spPr/>
+        <p:txBody>
+          <a:bodyPr>
+            <a:normAutofit lnSpcReduction="10000"/>
+          </a:bodyPr>
+          <a:lstStyle/>
+          <a:p>
+            <a:endParaRPr lang="en-US" sz="4800" dirty="0"/>
+          </a:p>
+          <a:p>
+            <a:r>
+              <a:rPr lang="en-US" sz="4800" dirty="0">
+                <a:solidFill>
+                  <a:schemeClr val="accent1"/>
+                </a:solidFill>
+              </a:rPr>
+              <a:t>aka.ms/</a:t>
+            </a:r>
+            <a:r>
+              <a:rPr lang="en-US" sz="4800" dirty="0" err="1">
+                <a:solidFill>
+                  <a:schemeClr val="accent1"/>
+                </a:solidFill>
+              </a:rPr>
+              <a:t>ThatSub</a:t>
+            </a:r>
+            <a:r>
+              <a:rPr lang="en-US" sz="4800" dirty="0"/>
+              <a:t> to create an Azure account</a:t>
+            </a:r>
+          </a:p>
+          <a:p>
+            <a:pPr marL="0" indent="0">
+              <a:buNone/>
+            </a:pPr>
+            <a:endParaRPr lang="en-US" sz="4800" dirty="0">
+              <a:hlinkClick r:id="rId2"/>
+            </a:endParaRPr>
+          </a:p>
+          <a:p>
+            <a:r>
+              <a:rPr lang="en-US" sz="4800" dirty="0"/>
+              <a:t>Go to </a:t>
+            </a:r>
+            <a:r>
+              <a:rPr lang="en-US" sz="4800" dirty="0">
+                <a:hlinkClick r:id="rId3"/>
+              </a:rPr>
+              <a:t>www.microsoftazurepass.com</a:t>
+            </a:r>
+            <a:r>
+              <a:rPr lang="en-US" sz="4800" dirty="0"/>
+              <a:t> to redeem a $100 Azure Credit</a:t>
+            </a:r>
+          </a:p>
+          <a:p>
+            <a:pPr marL="0" indent="0">
+              <a:buNone/>
+            </a:pPr>
+            <a:endParaRPr lang="en-US" dirty="0"/>
+          </a:p>
+        </p:txBody>
+      </p:sp>
+    </p:spTree>
+    <p:extLst>
+      <p:ext uri="{BB962C8B-B14F-4D97-AF65-F5344CB8AC3E}">
+        <p14:creationId xmlns:p14="http://schemas.microsoft.com/office/powerpoint/2010/main" val="110948903"/>
+      </p:ext>
+    </p:extLst>
+  </p:cSld>
+  <p:clrMapOvr>
+    <a:masterClrMapping/>
+  </p:clrMapOvr>
+</p:sld>
+</file>
+
+<file path=ppt/slides/slide49.xml><?xml version="1.0" encoding="utf-8"?>
+<p:sld xmlns:a="http://schemas.openxmlformats.org/drawingml/2006/main" xmlns:r="http://schemas.openxmlformats.org/officeDocument/2006/relationships" xmlns:p="http://schemas.openxmlformats.org/presentationml/2006/main">
+  <p:cSld>
+    <p:spTree>
+      <p:nvGrpSpPr>
+        <p:cNvPr id="1" name=""/>
+        <p:cNvGrpSpPr/>
+        <p:nvPr/>
+      </p:nvGrpSpPr>
+      <p:grpSpPr>
+        <a:xfrm>
+          <a:off x="0" y="0"/>
+          <a:ext cx="0" cy="0"/>
+          <a:chOff x="0" y="0"/>
+          <a:chExt cx="0" cy="0"/>
+        </a:xfrm>
+      </p:grpSpPr>
+      <p:sp>
+        <p:nvSpPr>
+          <p:cNvPr id="2" name="Title 1">
+            <a:extLst>
+              <a:ext uri="{FF2B5EF4-FFF2-40B4-BE49-F238E27FC236}">
+                <a16:creationId xmlns:a16="http://schemas.microsoft.com/office/drawing/2014/main" id="{004D667B-1058-4F4D-BDB8-EFA5AB21E389}"/>
+              </a:ext>
+            </a:extLst>
+          </p:cNvPr>
+          <p:cNvSpPr>
+            <a:spLocks noGrp="1"/>
+          </p:cNvSpPr>
+          <p:nvPr>
+            <p:ph type="title"/>
+          </p:nvPr>
+        </p:nvSpPr>
+        <p:spPr/>
+        <p:txBody>
+          <a:bodyPr/>
+          <a:lstStyle/>
+          <a:p>
+            <a:r>
+              <a:rPr lang="en-US" dirty="0"/>
+              <a:t>Create Azure Machine Learning Workspace</a:t>
+            </a:r>
+          </a:p>
+        </p:txBody>
+      </p:sp>
       <p:pic>
         <p:nvPicPr>
-          <p:cNvPr id="4" name="Picture 3">
+          <p:cNvPr id="6" name="Content Placeholder 5">
             <a:extLst>
               <a:ext uri="{FF2B5EF4-FFF2-40B4-BE49-F238E27FC236}">
-                <a16:creationId xmlns:a16="http://schemas.microsoft.com/office/drawing/2014/main" id="{09A1E986-7C43-4731-902A-69D0A6DDFC76}"/>
+                <a16:creationId xmlns:a16="http://schemas.microsoft.com/office/drawing/2014/main" id="{544A5A24-03CE-4997-9097-C6547DA7EA42}"/>
               </a:ext>
             </a:extLst>
           </p:cNvPr>
           <p:cNvPicPr>
-            <a:picLocks noChangeAspect="1"/>
+            <a:picLocks noGrp="1" noChangeAspect="1"/>
           </p:cNvPicPr>
-          <p:nvPr/>
+          <p:nvPr>
+            <p:ph idx="1"/>
+          </p:nvPr>
         </p:nvPicPr>
-        <p:blipFill rotWithShape="1">
-          <a:blip r:embed="rId3"/>
-          <a:srcRect t="3926"/>
-          <a:stretch/>
+        <p:blipFill>
+          <a:blip r:embed="rId2"/>
+          <a:stretch>
+            <a:fillRect/>
+          </a:stretch>
         </p:blipFill>
         <p:spPr>
           <a:xfrm>
-            <a:off x="556260" y="-6165"/>
-            <a:ext cx="11079480" cy="6864165"/>
+            <a:off x="1095011" y="1559618"/>
+            <a:ext cx="9370210" cy="4351338"/>
           </a:xfrm>
           <a:prstGeom prst="rect">
             <a:avLst/>
           </a:prstGeom>
         </p:spPr>
       </p:pic>
-      <mc:AlternateContent xmlns:mc="http://schemas.openxmlformats.org/markup-compatibility/2006" xmlns:p14="http://schemas.microsoft.com/office/powerpoint/2010/main">
-        <mc:Choice Requires="p14">
-          <p:contentPart p14:bwMode="auto" r:id="rId4">
-            <p14:nvContentPartPr>
-              <p14:cNvPr id="10" name="Ink 9">
-                <a:extLst>
-                  <a:ext uri="{FF2B5EF4-FFF2-40B4-BE49-F238E27FC236}">
-                    <a16:creationId xmlns:a16="http://schemas.microsoft.com/office/drawing/2014/main" id="{65908F1A-2BAE-4DEE-A543-B08F2B468D89}"/>
-                  </a:ext>
-                </a:extLst>
-              </p14:cNvPr>
-              <p14:cNvContentPartPr/>
-              <p14:nvPr/>
-            </p14:nvContentPartPr>
-            <p14:xfrm>
-              <a:off x="279240" y="3058560"/>
-              <a:ext cx="2646000" cy="893160"/>
-            </p14:xfrm>
-          </p:contentPart>
-        </mc:Choice>
-        <mc:Fallback xmlns="">
-          <p:pic>
-            <p:nvPicPr>
-              <p:cNvPr id="10" name="Ink 9">
-                <a:extLst>
-                  <a:ext uri="{FF2B5EF4-FFF2-40B4-BE49-F238E27FC236}">
-                    <a16:creationId xmlns:a16="http://schemas.microsoft.com/office/drawing/2014/main" id="{65908F1A-2BAE-4DEE-A543-B08F2B468D89}"/>
-                  </a:ext>
-                </a:extLst>
-              </p:cNvPr>
-              <p:cNvPicPr/>
-              <p:nvPr/>
-            </p:nvPicPr>
-            <p:blipFill>
-              <a:blip r:embed="rId5"/>
-              <a:stretch>
-                <a:fillRect/>
-              </a:stretch>
-            </p:blipFill>
-            <p:spPr>
-              <a:xfrm>
-                <a:off x="261600" y="3040560"/>
-                <a:ext cx="2681640" cy="928800"/>
-              </a:xfrm>
-              <a:prstGeom prst="rect">
-                <a:avLst/>
-              </a:prstGeom>
-            </p:spPr>
-          </p:pic>
-        </mc:Fallback>
-      </mc:AlternateContent>
     </p:spTree>
     <p:extLst>
       <p:ext uri="{BB962C8B-B14F-4D97-AF65-F5344CB8AC3E}">
-        <p14:creationId xmlns:p14="http://schemas.microsoft.com/office/powerpoint/2010/main" val="158077359"/>
+        <p14:creationId xmlns:p14="http://schemas.microsoft.com/office/powerpoint/2010/main" val="891164577"/>
       </p:ext>
     </p:extLst>
   </p:cSld>
   <p:clrMapOvr>
     <a:masterClrMapping/>
   </p:clrMapOvr>
-  <p:timing>
-    <p:tnLst>
-      <p:par>
-        <p:cTn id="1" dur="indefinite" restart="never" nodeType="tmRoot">
-          <p:childTnLst>
-            <p:seq concurrent="1" nextAc="seek">
-              <p:cTn id="2" dur="indefinite" nodeType="mainSeq">
-                <p:childTnLst>
-                  <p:par>
-                    <p:cTn id="3" fill="hold">
-                      <p:stCondLst>
-                        <p:cond delay="indefinite"/>
-                      </p:stCondLst>
-                      <p:childTnLst>
-                        <p:par>
-                          <p:cTn id="4" fill="hold">
-                            <p:stCondLst>
-                              <p:cond delay="0"/>
-                            </p:stCondLst>
-                            <p:childTnLst>
-                              <p:par>
-                                <p:cTn id="5" presetID="10" presetClass="entr" presetSubtype="0" fill="hold" nodeType="clickEffect">
-                                  <p:stCondLst>
-                                    <p:cond delay="0"/>
-                                  </p:stCondLst>
-                                  <p:childTnLst>
-                                    <p:set>
-                                      <p:cBhvr>
-                                        <p:cTn id="6" dur="1" fill="hold">
-                                          <p:stCondLst>
-                                            <p:cond delay="0"/>
-                                          </p:stCondLst>
-                                        </p:cTn>
-                                        <p:tgtEl>
-                                          <p:spTgt spid="10"/>
-                                        </p:tgtEl>
-                                        <p:attrNameLst>
-                                          <p:attrName>style.visibility</p:attrName>
-                                        </p:attrNameLst>
-                                      </p:cBhvr>
-                                      <p:to>
-                                        <p:strVal val="visible"/>
-                                      </p:to>
-                                    </p:set>
-                                    <p:animEffect transition="in" filter="fade">
-                                      <p:cBhvr>
-                                        <p:cTn id="7" dur="500"/>
-                                        <p:tgtEl>
-                                          <p:spTgt spid="10"/>
-                                        </p:tgtEl>
-                                      </p:cBhvr>
-                                    </p:animEffect>
-                                  </p:childTnLst>
-                                </p:cTn>
-                              </p:par>
-                            </p:childTnLst>
-                          </p:cTn>
-                        </p:par>
-                      </p:childTnLst>
-                    </p:cTn>
-                  </p:par>
-                </p:childTnLst>
-              </p:cTn>
-              <p:prevCondLst>
-                <p:cond evt="onPrev" delay="0">
-                  <p:tgtEl>
-                    <p:sldTgt/>
-                  </p:tgtEl>
-                </p:cond>
-              </p:prevCondLst>
-              <p:nextCondLst>
-                <p:cond evt="onNext" delay="0">
-                  <p:tgtEl>
-                    <p:sldTgt/>
-                  </p:tgtEl>
-                </p:cond>
-              </p:nextCondLst>
-            </p:seq>
-          </p:childTnLst>
-        </p:cTn>
-      </p:par>
-    </p:tnLst>
-  </p:timing>
 </p:sld>
 </file>
 
@@ -34068,6 +34092,606 @@
     <p:extLst>
       <p:ext uri="{BB962C8B-B14F-4D97-AF65-F5344CB8AC3E}">
         <p14:creationId xmlns:p14="http://schemas.microsoft.com/office/powerpoint/2010/main" val="4084054067"/>
+      </p:ext>
+    </p:extLst>
+  </p:cSld>
+  <p:clrMapOvr>
+    <a:masterClrMapping/>
+  </p:clrMapOvr>
+</p:sld>
+</file>
+
+<file path=ppt/slides/slide50.xml><?xml version="1.0" encoding="utf-8"?>
+<p:sld xmlns:a="http://schemas.openxmlformats.org/drawingml/2006/main" xmlns:r="http://schemas.openxmlformats.org/officeDocument/2006/relationships" xmlns:p="http://schemas.openxmlformats.org/presentationml/2006/main">
+  <p:cSld>
+    <p:spTree>
+      <p:nvGrpSpPr>
+        <p:cNvPr id="1" name=""/>
+        <p:cNvGrpSpPr/>
+        <p:nvPr/>
+      </p:nvGrpSpPr>
+      <p:grpSpPr>
+        <a:xfrm>
+          <a:off x="0" y="0"/>
+          <a:ext cx="0" cy="0"/>
+          <a:chOff x="0" y="0"/>
+          <a:chExt cx="0" cy="0"/>
+        </a:xfrm>
+      </p:grpSpPr>
+      <p:pic>
+        <p:nvPicPr>
+          <p:cNvPr id="8" name="Content Placeholder 7">
+            <a:extLst>
+              <a:ext uri="{FF2B5EF4-FFF2-40B4-BE49-F238E27FC236}">
+                <a16:creationId xmlns:a16="http://schemas.microsoft.com/office/drawing/2014/main" id="{D4636ABA-517F-45F1-BCEA-8AEC9CEEE082}"/>
+              </a:ext>
+            </a:extLst>
+          </p:cNvPr>
+          <p:cNvPicPr>
+            <a:picLocks noGrp="1" noChangeAspect="1"/>
+          </p:cNvPicPr>
+          <p:nvPr>
+            <p:ph idx="1"/>
+          </p:nvPr>
+        </p:nvPicPr>
+        <p:blipFill>
+          <a:blip r:embed="rId2"/>
+          <a:stretch>
+            <a:fillRect/>
+          </a:stretch>
+        </p:blipFill>
+        <p:spPr>
+          <a:xfrm>
+            <a:off x="1315413" y="165473"/>
+            <a:ext cx="9829184" cy="6627575"/>
+          </a:xfrm>
+          <a:prstGeom prst="rect">
+            <a:avLst/>
+          </a:prstGeom>
+        </p:spPr>
+      </p:pic>
+    </p:spTree>
+    <p:extLst>
+      <p:ext uri="{BB962C8B-B14F-4D97-AF65-F5344CB8AC3E}">
+        <p14:creationId xmlns:p14="http://schemas.microsoft.com/office/powerpoint/2010/main" val="166736047"/>
+      </p:ext>
+    </p:extLst>
+  </p:cSld>
+  <p:clrMapOvr>
+    <a:masterClrMapping/>
+  </p:clrMapOvr>
+</p:sld>
+</file>
+
+<file path=ppt/slides/slide51.xml><?xml version="1.0" encoding="utf-8"?>
+<p:sld xmlns:a="http://schemas.openxmlformats.org/drawingml/2006/main" xmlns:r="http://schemas.openxmlformats.org/officeDocument/2006/relationships" xmlns:p="http://schemas.openxmlformats.org/presentationml/2006/main">
+  <p:cSld>
+    <p:spTree>
+      <p:nvGrpSpPr>
+        <p:cNvPr id="1" name=""/>
+        <p:cNvGrpSpPr/>
+        <p:nvPr/>
+      </p:nvGrpSpPr>
+      <p:grpSpPr>
+        <a:xfrm>
+          <a:off x="0" y="0"/>
+          <a:ext cx="0" cy="0"/>
+          <a:chOff x="0" y="0"/>
+          <a:chExt cx="0" cy="0"/>
+        </a:xfrm>
+      </p:grpSpPr>
+      <p:pic>
+        <p:nvPicPr>
+          <p:cNvPr id="2" name="Picture 1">
+            <a:extLst>
+              <a:ext uri="{FF2B5EF4-FFF2-40B4-BE49-F238E27FC236}">
+                <a16:creationId xmlns:a16="http://schemas.microsoft.com/office/drawing/2014/main" id="{BC54A1AA-2BD6-41DF-8D80-419393EE9119}"/>
+              </a:ext>
+            </a:extLst>
+          </p:cNvPr>
+          <p:cNvPicPr>
+            <a:picLocks noChangeAspect="1"/>
+          </p:cNvPicPr>
+          <p:nvPr/>
+        </p:nvPicPr>
+        <p:blipFill>
+          <a:blip r:embed="rId3"/>
+          <a:stretch>
+            <a:fillRect/>
+          </a:stretch>
+        </p:blipFill>
+        <p:spPr>
+          <a:xfrm>
+            <a:off x="570807" y="0"/>
+            <a:ext cx="11050385" cy="6858000"/>
+          </a:xfrm>
+          <a:prstGeom prst="rect">
+            <a:avLst/>
+          </a:prstGeom>
+        </p:spPr>
+      </p:pic>
+    </p:spTree>
+    <p:extLst>
+      <p:ext uri="{BB962C8B-B14F-4D97-AF65-F5344CB8AC3E}">
+        <p14:creationId xmlns:p14="http://schemas.microsoft.com/office/powerpoint/2010/main" val="158077359"/>
+      </p:ext>
+    </p:extLst>
+  </p:cSld>
+  <p:clrMapOvr>
+    <a:masterClrMapping/>
+  </p:clrMapOvr>
+</p:sld>
+</file>
+
+<file path=ppt/slides/slide52.xml><?xml version="1.0" encoding="utf-8"?>
+<p:sld xmlns:a="http://schemas.openxmlformats.org/drawingml/2006/main" xmlns:r="http://schemas.openxmlformats.org/officeDocument/2006/relationships" xmlns:p="http://schemas.openxmlformats.org/presentationml/2006/main">
+  <p:cSld>
+    <p:spTree>
+      <p:nvGrpSpPr>
+        <p:cNvPr id="1" name=""/>
+        <p:cNvGrpSpPr/>
+        <p:nvPr/>
+      </p:nvGrpSpPr>
+      <p:grpSpPr>
+        <a:xfrm>
+          <a:off x="0" y="0"/>
+          <a:ext cx="0" cy="0"/>
+          <a:chOff x="0" y="0"/>
+          <a:chExt cx="0" cy="0"/>
+        </a:xfrm>
+      </p:grpSpPr>
+      <p:pic>
+        <p:nvPicPr>
+          <p:cNvPr id="4" name="Picture 3">
+            <a:extLst>
+              <a:ext uri="{FF2B5EF4-FFF2-40B4-BE49-F238E27FC236}">
+                <a16:creationId xmlns:a16="http://schemas.microsoft.com/office/drawing/2014/main" id="{0E9CB9D7-6589-4CF5-9445-DEE15A8E3FFC}"/>
+              </a:ext>
+            </a:extLst>
+          </p:cNvPr>
+          <p:cNvPicPr>
+            <a:picLocks noChangeAspect="1"/>
+          </p:cNvPicPr>
+          <p:nvPr/>
+        </p:nvPicPr>
+        <p:blipFill>
+          <a:blip r:embed="rId2"/>
+          <a:stretch>
+            <a:fillRect/>
+          </a:stretch>
+        </p:blipFill>
+        <p:spPr>
+          <a:xfrm>
+            <a:off x="0" y="484481"/>
+            <a:ext cx="12192000" cy="5889037"/>
+          </a:xfrm>
+          <a:prstGeom prst="rect">
+            <a:avLst/>
+          </a:prstGeom>
+        </p:spPr>
+      </p:pic>
+    </p:spTree>
+    <p:extLst>
+      <p:ext uri="{BB962C8B-B14F-4D97-AF65-F5344CB8AC3E}">
+        <p14:creationId xmlns:p14="http://schemas.microsoft.com/office/powerpoint/2010/main" val="2293117289"/>
+      </p:ext>
+    </p:extLst>
+  </p:cSld>
+  <p:clrMapOvr>
+    <a:masterClrMapping/>
+  </p:clrMapOvr>
+</p:sld>
+</file>
+
+<file path=ppt/slides/slide53.xml><?xml version="1.0" encoding="utf-8"?>
+<p:sld xmlns:a="http://schemas.openxmlformats.org/drawingml/2006/main" xmlns:r="http://schemas.openxmlformats.org/officeDocument/2006/relationships" xmlns:p="http://schemas.openxmlformats.org/presentationml/2006/main">
+  <p:cSld>
+    <p:spTree>
+      <p:nvGrpSpPr>
+        <p:cNvPr id="1" name=""/>
+        <p:cNvGrpSpPr/>
+        <p:nvPr/>
+      </p:nvGrpSpPr>
+      <p:grpSpPr>
+        <a:xfrm>
+          <a:off x="0" y="0"/>
+          <a:ext cx="0" cy="0"/>
+          <a:chOff x="0" y="0"/>
+          <a:chExt cx="0" cy="0"/>
+        </a:xfrm>
+      </p:grpSpPr>
+      <p:pic>
+        <p:nvPicPr>
+          <p:cNvPr id="2" name="Picture 1">
+            <a:extLst>
+              <a:ext uri="{FF2B5EF4-FFF2-40B4-BE49-F238E27FC236}">
+                <a16:creationId xmlns:a16="http://schemas.microsoft.com/office/drawing/2014/main" id="{701F9E6B-E0DD-42CE-BAEE-E3EE755405E8}"/>
+              </a:ext>
+            </a:extLst>
+          </p:cNvPr>
+          <p:cNvPicPr>
+            <a:picLocks noChangeAspect="1"/>
+          </p:cNvPicPr>
+          <p:nvPr/>
+        </p:nvPicPr>
+        <p:blipFill>
+          <a:blip r:embed="rId2"/>
+          <a:stretch>
+            <a:fillRect/>
+          </a:stretch>
+        </p:blipFill>
+        <p:spPr>
+          <a:xfrm>
+            <a:off x="0" y="698105"/>
+            <a:ext cx="12192000" cy="2197187"/>
+          </a:xfrm>
+          <a:prstGeom prst="rect">
+            <a:avLst/>
+          </a:prstGeom>
+        </p:spPr>
+      </p:pic>
+    </p:spTree>
+    <p:extLst>
+      <p:ext uri="{BB962C8B-B14F-4D97-AF65-F5344CB8AC3E}">
+        <p14:creationId xmlns:p14="http://schemas.microsoft.com/office/powerpoint/2010/main" val="3654913122"/>
+      </p:ext>
+    </p:extLst>
+  </p:cSld>
+  <p:clrMapOvr>
+    <a:masterClrMapping/>
+  </p:clrMapOvr>
+</p:sld>
+</file>
+
+<file path=ppt/slides/slide54.xml><?xml version="1.0" encoding="utf-8"?>
+<p:sld xmlns:a="http://schemas.openxmlformats.org/drawingml/2006/main" xmlns:r="http://schemas.openxmlformats.org/officeDocument/2006/relationships" xmlns:p="http://schemas.openxmlformats.org/presentationml/2006/main">
+  <p:cSld>
+    <p:spTree>
+      <p:nvGrpSpPr>
+        <p:cNvPr id="1" name=""/>
+        <p:cNvGrpSpPr/>
+        <p:nvPr/>
+      </p:nvGrpSpPr>
+      <p:grpSpPr>
+        <a:xfrm>
+          <a:off x="0" y="0"/>
+          <a:ext cx="0" cy="0"/>
+          <a:chOff x="0" y="0"/>
+          <a:chExt cx="0" cy="0"/>
+        </a:xfrm>
+      </p:grpSpPr>
+      <p:pic>
+        <p:nvPicPr>
+          <p:cNvPr id="2" name="Picture 1">
+            <a:extLst>
+              <a:ext uri="{FF2B5EF4-FFF2-40B4-BE49-F238E27FC236}">
+                <a16:creationId xmlns:a16="http://schemas.microsoft.com/office/drawing/2014/main" id="{265931BB-6144-4DE3-B1BA-C64B15122022}"/>
+              </a:ext>
+            </a:extLst>
+          </p:cNvPr>
+          <p:cNvPicPr>
+            <a:picLocks noChangeAspect="1"/>
+          </p:cNvPicPr>
+          <p:nvPr/>
+        </p:nvPicPr>
+        <p:blipFill>
+          <a:blip r:embed="rId2"/>
+          <a:stretch>
+            <a:fillRect/>
+          </a:stretch>
+        </p:blipFill>
+        <p:spPr>
+          <a:xfrm>
+            <a:off x="1889371" y="0"/>
+            <a:ext cx="8413258" cy="6858000"/>
+          </a:xfrm>
+          <a:prstGeom prst="rect">
+            <a:avLst/>
+          </a:prstGeom>
+        </p:spPr>
+      </p:pic>
+    </p:spTree>
+    <p:extLst>
+      <p:ext uri="{BB962C8B-B14F-4D97-AF65-F5344CB8AC3E}">
+        <p14:creationId xmlns:p14="http://schemas.microsoft.com/office/powerpoint/2010/main" val="118033814"/>
+      </p:ext>
+    </p:extLst>
+  </p:cSld>
+  <p:clrMapOvr>
+    <a:masterClrMapping/>
+  </p:clrMapOvr>
+</p:sld>
+</file>
+
+<file path=ppt/slides/slide55.xml><?xml version="1.0" encoding="utf-8"?>
+<p:sld xmlns:a="http://schemas.openxmlformats.org/drawingml/2006/main" xmlns:r="http://schemas.openxmlformats.org/officeDocument/2006/relationships" xmlns:p="http://schemas.openxmlformats.org/presentationml/2006/main">
+  <p:cSld>
+    <p:spTree>
+      <p:nvGrpSpPr>
+        <p:cNvPr id="1" name=""/>
+        <p:cNvGrpSpPr/>
+        <p:nvPr/>
+      </p:nvGrpSpPr>
+      <p:grpSpPr>
+        <a:xfrm>
+          <a:off x="0" y="0"/>
+          <a:ext cx="0" cy="0"/>
+          <a:chOff x="0" y="0"/>
+          <a:chExt cx="0" cy="0"/>
+        </a:xfrm>
+      </p:grpSpPr>
+      <p:sp>
+        <p:nvSpPr>
+          <p:cNvPr id="2" name="Title 1">
+            <a:extLst>
+              <a:ext uri="{FF2B5EF4-FFF2-40B4-BE49-F238E27FC236}">
+                <a16:creationId xmlns:a16="http://schemas.microsoft.com/office/drawing/2014/main" id="{52F92B71-6D08-4C81-AB1D-A555CAE4A6DC}"/>
+              </a:ext>
+            </a:extLst>
+          </p:cNvPr>
+          <p:cNvSpPr>
+            <a:spLocks noGrp="1"/>
+          </p:cNvSpPr>
+          <p:nvPr>
+            <p:ph type="title"/>
+          </p:nvPr>
+        </p:nvSpPr>
+        <p:spPr>
+          <a:xfrm>
+            <a:off x="-319734" y="236464"/>
+            <a:ext cx="12300240" cy="1325563"/>
+          </a:xfrm>
+        </p:spPr>
+        <p:txBody>
+          <a:bodyPr>
+            <a:normAutofit/>
+          </a:bodyPr>
+          <a:lstStyle/>
+          <a:p>
+            <a:pPr algn="ctr"/>
+            <a:r>
+              <a:rPr lang="en-US" sz="6600" b="1" dirty="0"/>
+              <a:t>Workshop Overview</a:t>
+            </a:r>
+          </a:p>
+        </p:txBody>
+      </p:sp>
+      <p:sp>
+        <p:nvSpPr>
+          <p:cNvPr id="3" name="Content Placeholder 2">
+            <a:extLst>
+              <a:ext uri="{FF2B5EF4-FFF2-40B4-BE49-F238E27FC236}">
+                <a16:creationId xmlns:a16="http://schemas.microsoft.com/office/drawing/2014/main" id="{BD46CE57-81CB-4E7D-AAE7-BF6BFEDC2377}"/>
+              </a:ext>
+            </a:extLst>
+          </p:cNvPr>
+          <p:cNvSpPr>
+            <a:spLocks noGrp="1"/>
+          </p:cNvSpPr>
+          <p:nvPr>
+            <p:ph idx="1"/>
+          </p:nvPr>
+        </p:nvSpPr>
+        <p:spPr>
+          <a:xfrm>
+            <a:off x="2318291" y="1658460"/>
+            <a:ext cx="12050852" cy="886691"/>
+          </a:xfrm>
+        </p:spPr>
+        <p:txBody>
+          <a:bodyPr>
+            <a:normAutofit fontScale="92500" lnSpcReduction="10000"/>
+          </a:bodyPr>
+          <a:lstStyle/>
+          <a:p>
+            <a:pPr marL="0" indent="0">
+              <a:buNone/>
+            </a:pPr>
+            <a:r>
+              <a:rPr lang="en-US" sz="6600" dirty="0">
+                <a:solidFill>
+                  <a:schemeClr val="accent1"/>
+                </a:solidFill>
+              </a:rPr>
+              <a:t>aka.ms/</a:t>
+            </a:r>
+            <a:r>
+              <a:rPr lang="en-US" sz="6600" dirty="0" err="1">
+                <a:solidFill>
+                  <a:schemeClr val="accent1"/>
+                </a:solidFill>
+              </a:rPr>
+              <a:t>ThatWorkshop</a:t>
+            </a:r>
+            <a:endParaRPr lang="en-US" sz="6600" dirty="0">
+              <a:solidFill>
+                <a:schemeClr val="accent1"/>
+              </a:solidFill>
+            </a:endParaRPr>
+          </a:p>
+        </p:txBody>
+      </p:sp>
+      <p:pic>
+        <p:nvPicPr>
+          <p:cNvPr id="4" name="Picture 3">
+            <a:extLst>
+              <a:ext uri="{FF2B5EF4-FFF2-40B4-BE49-F238E27FC236}">
+                <a16:creationId xmlns:a16="http://schemas.microsoft.com/office/drawing/2014/main" id="{4A6069F3-01B9-408D-B4E1-81F1B82AEDA0}"/>
+              </a:ext>
+            </a:extLst>
+          </p:cNvPr>
+          <p:cNvPicPr>
+            <a:picLocks noChangeAspect="1"/>
+          </p:cNvPicPr>
+          <p:nvPr/>
+        </p:nvPicPr>
+        <p:blipFill>
+          <a:blip r:embed="rId2"/>
+          <a:stretch>
+            <a:fillRect/>
+          </a:stretch>
+        </p:blipFill>
+        <p:spPr>
+          <a:xfrm>
+            <a:off x="66503" y="2921584"/>
+            <a:ext cx="12192000" cy="2910134"/>
+          </a:xfrm>
+          <a:prstGeom prst="rect">
+            <a:avLst/>
+          </a:prstGeom>
+        </p:spPr>
+      </p:pic>
+    </p:spTree>
+    <p:extLst>
+      <p:ext uri="{BB962C8B-B14F-4D97-AF65-F5344CB8AC3E}">
+        <p14:creationId xmlns:p14="http://schemas.microsoft.com/office/powerpoint/2010/main" val="3893138765"/>
+      </p:ext>
+    </p:extLst>
+  </p:cSld>
+  <p:clrMapOvr>
+    <a:masterClrMapping/>
+  </p:clrMapOvr>
+</p:sld>
+</file>
+
+<file path=ppt/slides/slide56.xml><?xml version="1.0" encoding="utf-8"?>
+<p:sld xmlns:a="http://schemas.openxmlformats.org/drawingml/2006/main" xmlns:r="http://schemas.openxmlformats.org/officeDocument/2006/relationships" xmlns:p="http://schemas.openxmlformats.org/presentationml/2006/main">
+  <p:cSld>
+    <p:spTree>
+      <p:nvGrpSpPr>
+        <p:cNvPr id="1" name=""/>
+        <p:cNvGrpSpPr/>
+        <p:nvPr/>
+      </p:nvGrpSpPr>
+      <p:grpSpPr>
+        <a:xfrm>
+          <a:off x="0" y="0"/>
+          <a:ext cx="0" cy="0"/>
+          <a:chOff x="0" y="0"/>
+          <a:chExt cx="0" cy="0"/>
+        </a:xfrm>
+      </p:grpSpPr>
+      <p:sp>
+        <p:nvSpPr>
+          <p:cNvPr id="4" name="TextBox 3">
+            <a:extLst>
+              <a:ext uri="{FF2B5EF4-FFF2-40B4-BE49-F238E27FC236}">
+                <a16:creationId xmlns:a16="http://schemas.microsoft.com/office/drawing/2014/main" id="{7F657011-FC1B-447A-9843-F36BA0B4BEDD}"/>
+              </a:ext>
+            </a:extLst>
+          </p:cNvPr>
+          <p:cNvSpPr txBox="1"/>
+          <p:nvPr/>
+        </p:nvSpPr>
+        <p:spPr>
+          <a:xfrm>
+            <a:off x="234344" y="294078"/>
+            <a:ext cx="9396723" cy="3416320"/>
+          </a:xfrm>
+          <a:prstGeom prst="rect">
+            <a:avLst/>
+          </a:prstGeom>
+          <a:noFill/>
+        </p:spPr>
+        <p:txBody>
+          <a:bodyPr wrap="square" rtlCol="0">
+            <a:spAutoFit/>
+          </a:bodyPr>
+          <a:lstStyle/>
+          <a:p>
+            <a:pPr marL="285750" indent="-285750">
+              <a:buFont typeface="Arial" panose="020B0604020202020204" pitchFamily="34" charset="0"/>
+              <a:buChar char="•"/>
+            </a:pPr>
+            <a:r>
+              <a:rPr lang="en-US" sz="3600" dirty="0"/>
+              <a:t>Select the workshop to complete</a:t>
+            </a:r>
+          </a:p>
+          <a:p>
+            <a:pPr marL="285750" indent="-285750">
+              <a:buFont typeface="Arial" panose="020B0604020202020204" pitchFamily="34" charset="0"/>
+              <a:buChar char="•"/>
+            </a:pPr>
+            <a:r>
+              <a:rPr lang="en-US" sz="3600" dirty="0"/>
+              <a:t>Copy the repo link</a:t>
+            </a:r>
+          </a:p>
+          <a:p>
+            <a:pPr marL="285750" indent="-285750">
+              <a:buFont typeface="Arial" panose="020B0604020202020204" pitchFamily="34" charset="0"/>
+              <a:buChar char="•"/>
+            </a:pPr>
+            <a:r>
+              <a:rPr lang="en-US" sz="3600" dirty="0"/>
+              <a:t>Go back to the terminal in </a:t>
+            </a:r>
+            <a:r>
+              <a:rPr lang="en-US" sz="3600" dirty="0" err="1"/>
+              <a:t>Jupyter</a:t>
+            </a:r>
+            <a:r>
+              <a:rPr lang="en-US" sz="3600" dirty="0"/>
+              <a:t> Lab</a:t>
+            </a:r>
+          </a:p>
+          <a:p>
+            <a:pPr marL="285750" indent="-285750">
+              <a:buFont typeface="Arial" panose="020B0604020202020204" pitchFamily="34" charset="0"/>
+              <a:buChar char="•"/>
+            </a:pPr>
+            <a:r>
+              <a:rPr lang="en-US" sz="3600" dirty="0"/>
+              <a:t>`git clone` and paste link with CTRL+SHIFT+V</a:t>
+            </a:r>
+          </a:p>
+          <a:p>
+            <a:endParaRPr lang="en-US" sz="3600" dirty="0"/>
+          </a:p>
+          <a:p>
+            <a:pPr marL="285750" indent="-285750">
+              <a:buFont typeface="Arial" panose="020B0604020202020204" pitchFamily="34" charset="0"/>
+              <a:buChar char="•"/>
+            </a:pPr>
+            <a:endParaRPr lang="en-US" sz="3600" dirty="0"/>
+          </a:p>
+        </p:txBody>
+      </p:sp>
+      <p:pic>
+        <p:nvPicPr>
+          <p:cNvPr id="5" name="Picture 4">
+            <a:extLst>
+              <a:ext uri="{FF2B5EF4-FFF2-40B4-BE49-F238E27FC236}">
+                <a16:creationId xmlns:a16="http://schemas.microsoft.com/office/drawing/2014/main" id="{BA72DF2C-E787-47BC-8486-8C720013461C}"/>
+              </a:ext>
+            </a:extLst>
+          </p:cNvPr>
+          <p:cNvPicPr>
+            <a:picLocks noChangeAspect="1"/>
+          </p:cNvPicPr>
+          <p:nvPr/>
+        </p:nvPicPr>
+        <p:blipFill>
+          <a:blip r:embed="rId2"/>
+          <a:stretch>
+            <a:fillRect/>
+          </a:stretch>
+        </p:blipFill>
+        <p:spPr>
+          <a:xfrm>
+            <a:off x="-74644" y="2949221"/>
+            <a:ext cx="12192000" cy="2937648"/>
+          </a:xfrm>
+          <a:prstGeom prst="rect">
+            <a:avLst/>
+          </a:prstGeom>
+        </p:spPr>
+      </p:pic>
+    </p:spTree>
+    <p:extLst>
+      <p:ext uri="{BB962C8B-B14F-4D97-AF65-F5344CB8AC3E}">
+        <p14:creationId xmlns:p14="http://schemas.microsoft.com/office/powerpoint/2010/main" val="2487541512"/>
       </p:ext>
     </p:extLst>
   </p:cSld>

</xml_diff>